<commit_message>
Updated routing in Azure with service endpoint
</commit_message>
<xml_diff>
--- a/images/Azure_Network_Design.pptx
+++ b/images/Azure_Network_Design.pptx
@@ -126,12 +126,12 @@
   <pc:docChgLst>
     <pc:chgData name="Sarkar, Abhinab" userId="2e82f8fd-5e59-4eab-84bb-db56683054af" providerId="ADAL" clId="{92AFEA2A-68E3-433D-A17F-A80427E89623}"/>
     <pc:docChg chg="undo custSel delSld modSld sldOrd">
-      <pc:chgData name="Sarkar, Abhinab" userId="2e82f8fd-5e59-4eab-84bb-db56683054af" providerId="ADAL" clId="{92AFEA2A-68E3-433D-A17F-A80427E89623}" dt="2021-05-21T19:29:05.891" v="513" actId="1076"/>
+      <pc:chgData name="Sarkar, Abhinab" userId="2e82f8fd-5e59-4eab-84bb-db56683054af" providerId="ADAL" clId="{92AFEA2A-68E3-433D-A17F-A80427E89623}" dt="2021-05-23T21:34:10.304" v="519" actId="20577"/>
       <pc:docMkLst>
         <pc:docMk/>
       </pc:docMkLst>
       <pc:sldChg chg="addSp delSp modSp">
-        <pc:chgData name="Sarkar, Abhinab" userId="2e82f8fd-5e59-4eab-84bb-db56683054af" providerId="ADAL" clId="{92AFEA2A-68E3-433D-A17F-A80427E89623}" dt="2021-05-21T19:24:54.270" v="439" actId="1076"/>
+        <pc:chgData name="Sarkar, Abhinab" userId="2e82f8fd-5e59-4eab-84bb-db56683054af" providerId="ADAL" clId="{92AFEA2A-68E3-433D-A17F-A80427E89623}" dt="2021-05-23T21:34:10.304" v="519" actId="20577"/>
         <pc:sldMkLst>
           <pc:docMk/>
           <pc:sldMk cId="2587440602" sldId="261"/>
@@ -169,7 +169,7 @@
           </ac:spMkLst>
         </pc:spChg>
         <pc:spChg chg="mod">
-          <ac:chgData name="Sarkar, Abhinab" userId="2e82f8fd-5e59-4eab-84bb-db56683054af" providerId="ADAL" clId="{92AFEA2A-68E3-433D-A17F-A80427E89623}" dt="2021-05-21T19:17:43.538" v="392" actId="20577"/>
+          <ac:chgData name="Sarkar, Abhinab" userId="2e82f8fd-5e59-4eab-84bb-db56683054af" providerId="ADAL" clId="{92AFEA2A-68E3-433D-A17F-A80427E89623}" dt="2021-05-23T21:34:06.289" v="517" actId="20577"/>
           <ac:spMkLst>
             <pc:docMk/>
             <pc:sldMk cId="2587440602" sldId="261"/>
@@ -177,7 +177,7 @@
           </ac:spMkLst>
         </pc:spChg>
         <pc:spChg chg="mod">
-          <ac:chgData name="Sarkar, Abhinab" userId="2e82f8fd-5e59-4eab-84bb-db56683054af" providerId="ADAL" clId="{92AFEA2A-68E3-433D-A17F-A80427E89623}" dt="2021-05-21T19:21:46.108" v="425" actId="20577"/>
+          <ac:chgData name="Sarkar, Abhinab" userId="2e82f8fd-5e59-4eab-84bb-db56683054af" providerId="ADAL" clId="{92AFEA2A-68E3-433D-A17F-A80427E89623}" dt="2021-05-23T21:34:01.795" v="515" actId="20577"/>
           <ac:spMkLst>
             <pc:docMk/>
             <pc:sldMk cId="2587440602" sldId="261"/>
@@ -241,7 +241,7 @@
           </ac:spMkLst>
         </pc:spChg>
         <pc:spChg chg="mod">
-          <ac:chgData name="Sarkar, Abhinab" userId="2e82f8fd-5e59-4eab-84bb-db56683054af" providerId="ADAL" clId="{92AFEA2A-68E3-433D-A17F-A80427E89623}" dt="2021-05-21T19:17:18.610" v="377" actId="20577"/>
+          <ac:chgData name="Sarkar, Abhinab" userId="2e82f8fd-5e59-4eab-84bb-db56683054af" providerId="ADAL" clId="{92AFEA2A-68E3-433D-A17F-A80427E89623}" dt="2021-05-23T21:34:10.304" v="519" actId="20577"/>
           <ac:spMkLst>
             <pc:docMk/>
             <pc:sldMk cId="2587440602" sldId="261"/>
@@ -705,7 +705,7 @@
           <a:p>
             <a:fld id="{7BA813FB-B536-49A1-BDF8-EB35DA202AA1}" type="datetimeFigureOut">
               <a:rPr lang="en-CA" smtClean="0"/>
-              <a:t>2021-05-21</a:t>
+              <a:t>2021-05-23</a:t>
             </a:fld>
             <a:endParaRPr lang="en-CA"/>
           </a:p>
@@ -905,7 +905,7 @@
           <a:p>
             <a:fld id="{7BA813FB-B536-49A1-BDF8-EB35DA202AA1}" type="datetimeFigureOut">
               <a:rPr lang="en-CA" smtClean="0"/>
-              <a:t>2021-05-21</a:t>
+              <a:t>2021-05-23</a:t>
             </a:fld>
             <a:endParaRPr lang="en-CA"/>
           </a:p>
@@ -1115,7 +1115,7 @@
           <a:p>
             <a:fld id="{7BA813FB-B536-49A1-BDF8-EB35DA202AA1}" type="datetimeFigureOut">
               <a:rPr lang="en-CA" smtClean="0"/>
-              <a:t>2021-05-21</a:t>
+              <a:t>2021-05-23</a:t>
             </a:fld>
             <a:endParaRPr lang="en-CA"/>
           </a:p>
@@ -1315,7 +1315,7 @@
           <a:p>
             <a:fld id="{7BA813FB-B536-49A1-BDF8-EB35DA202AA1}" type="datetimeFigureOut">
               <a:rPr lang="en-CA" smtClean="0"/>
-              <a:t>2021-05-21</a:t>
+              <a:t>2021-05-23</a:t>
             </a:fld>
             <a:endParaRPr lang="en-CA"/>
           </a:p>
@@ -1591,7 +1591,7 @@
           <a:p>
             <a:fld id="{7BA813FB-B536-49A1-BDF8-EB35DA202AA1}" type="datetimeFigureOut">
               <a:rPr lang="en-CA" smtClean="0"/>
-              <a:t>2021-05-21</a:t>
+              <a:t>2021-05-23</a:t>
             </a:fld>
             <a:endParaRPr lang="en-CA"/>
           </a:p>
@@ -1859,7 +1859,7 @@
           <a:p>
             <a:fld id="{7BA813FB-B536-49A1-BDF8-EB35DA202AA1}" type="datetimeFigureOut">
               <a:rPr lang="en-CA" smtClean="0"/>
-              <a:t>2021-05-21</a:t>
+              <a:t>2021-05-23</a:t>
             </a:fld>
             <a:endParaRPr lang="en-CA"/>
           </a:p>
@@ -2274,7 +2274,7 @@
           <a:p>
             <a:fld id="{7BA813FB-B536-49A1-BDF8-EB35DA202AA1}" type="datetimeFigureOut">
               <a:rPr lang="en-CA" smtClean="0"/>
-              <a:t>2021-05-21</a:t>
+              <a:t>2021-05-23</a:t>
             </a:fld>
             <a:endParaRPr lang="en-CA"/>
           </a:p>
@@ -2416,7 +2416,7 @@
           <a:p>
             <a:fld id="{7BA813FB-B536-49A1-BDF8-EB35DA202AA1}" type="datetimeFigureOut">
               <a:rPr lang="en-CA" smtClean="0"/>
-              <a:t>2021-05-21</a:t>
+              <a:t>2021-05-23</a:t>
             </a:fld>
             <a:endParaRPr lang="en-CA"/>
           </a:p>
@@ -2529,7 +2529,7 @@
           <a:p>
             <a:fld id="{7BA813FB-B536-49A1-BDF8-EB35DA202AA1}" type="datetimeFigureOut">
               <a:rPr lang="en-CA" smtClean="0"/>
-              <a:t>2021-05-21</a:t>
+              <a:t>2021-05-23</a:t>
             </a:fld>
             <a:endParaRPr lang="en-CA"/>
           </a:p>
@@ -2842,7 +2842,7 @@
           <a:p>
             <a:fld id="{7BA813FB-B536-49A1-BDF8-EB35DA202AA1}" type="datetimeFigureOut">
               <a:rPr lang="en-CA" smtClean="0"/>
-              <a:t>2021-05-21</a:t>
+              <a:t>2021-05-23</a:t>
             </a:fld>
             <a:endParaRPr lang="en-CA"/>
           </a:p>
@@ -3131,7 +3131,7 @@
           <a:p>
             <a:fld id="{7BA813FB-B536-49A1-BDF8-EB35DA202AA1}" type="datetimeFigureOut">
               <a:rPr lang="en-CA" smtClean="0"/>
-              <a:t>2021-05-21</a:t>
+              <a:t>2021-05-23</a:t>
             </a:fld>
             <a:endParaRPr lang="en-CA"/>
           </a:p>
@@ -3374,7 +3374,7 @@
           <a:p>
             <a:fld id="{7BA813FB-B536-49A1-BDF8-EB35DA202AA1}" type="datetimeFigureOut">
               <a:rPr lang="en-CA" smtClean="0"/>
-              <a:t>2021-05-21</a:t>
+              <a:t>2021-05-23</a:t>
             </a:fld>
             <a:endParaRPr lang="en-CA"/>
           </a:p>
@@ -8966,7 +8966,7 @@
                     <a:schemeClr val="tx1"/>
                   </a:solidFill>
                 </a:rPr>
-                <a:t>Subnet – 10.1.0.0/24 (Application)</a:t>
+                <a:t>Subnet – 10.3.0.0/24 (Application)</a:t>
               </a:r>
             </a:p>
           </p:txBody>
@@ -9023,7 +9023,7 @@
                     <a:schemeClr val="tx1"/>
                   </a:solidFill>
                 </a:rPr>
-                <a:t>Spoke VNet – 10.1.0.0/16</a:t>
+                <a:t>Spoke VNet – 10.3.0.0/16</a:t>
               </a:r>
             </a:p>
           </p:txBody>
@@ -9399,13 +9399,13 @@
           <a:lstStyle/>
           <a:p>
             <a:r>
-              <a:rPr lang="en-CA" sz="1000" b="0" i="0" dirty="0">
+              <a:rPr lang="en-CA" sz="1000" b="0" i="0">
                 <a:solidFill>
                   <a:srgbClr val="000000"/>
                 </a:solidFill>
                 <a:effectLst/>
               </a:rPr>
-              <a:t>10.1.0.4</a:t>
+              <a:t>10.3.0.4</a:t>
             </a:r>
             <a:endParaRPr lang="en-CA" sz="1000" dirty="0"/>
           </a:p>
@@ -12075,6 +12075,21 @@
 </file>
 
 <file path=customXml/item1.xml><?xml version="1.0" encoding="utf-8"?>
+<?mso-contentType ?>
+<FormTemplates xmlns="http://schemas.microsoft.com/sharepoint/v3/contenttype/forms">
+  <Display>DocumentLibraryForm</Display>
+  <Edit>DocumentLibraryForm</Edit>
+  <New>DocumentLibraryForm</New>
+</FormTemplates>
+</file>
+
+<file path=customXml/item2.xml><?xml version="1.0" encoding="utf-8"?>
+<p:properties xmlns:p="http://schemas.microsoft.com/office/2006/metadata/properties" xmlns:xsi="http://www.w3.org/2001/XMLSchema-instance" xmlns:pc="http://schemas.microsoft.com/office/infopath/2007/PartnerControls">
+  <documentManagement/>
+</p:properties>
+</file>
+
+<file path=customXml/item3.xml><?xml version="1.0" encoding="utf-8"?>
 <ct:contentTypeSchema xmlns:ct="http://schemas.microsoft.com/office/2006/metadata/contentType" xmlns:ma="http://schemas.microsoft.com/office/2006/metadata/properties/metaAttributes" ct:_="" ma:_="" ma:contentTypeName="Document" ma:contentTypeID="0x010100242564A9FF0B1944AF513303B2F2A476" ma:contentTypeVersion="0" ma:contentTypeDescription="Create a new document." ma:contentTypeScope="" ma:versionID="7195a60309bb76be37dc0415bb581197">
   <xsd:schema xmlns:xsd="http://www.w3.org/2001/XMLSchema" xmlns:xs="http://www.w3.org/2001/XMLSchema" xmlns:p="http://schemas.microsoft.com/office/2006/metadata/properties" targetNamespace="http://schemas.microsoft.com/office/2006/metadata/properties" ma:root="true" ma:fieldsID="d16a65b1dbdfbb1bb1152148147941dd">
     <xsd:element name="properties">
@@ -12188,33 +12203,10 @@
 </ct:contentTypeSchema>
 </file>
 
-<file path=customXml/item2.xml><?xml version="1.0" encoding="utf-8"?>
-<p:properties xmlns:p="http://schemas.microsoft.com/office/2006/metadata/properties" xmlns:xsi="http://www.w3.org/2001/XMLSchema-instance" xmlns:pc="http://schemas.microsoft.com/office/infopath/2007/PartnerControls">
-  <documentManagement/>
-</p:properties>
-</file>
-
-<file path=customXml/item3.xml><?xml version="1.0" encoding="utf-8"?>
-<?mso-contentType ?>
-<FormTemplates xmlns="http://schemas.microsoft.com/sharepoint/v3/contenttype/forms">
-  <Display>DocumentLibraryForm</Display>
-  <Edit>DocumentLibraryForm</Edit>
-  <New>DocumentLibraryForm</New>
-</FormTemplates>
-</file>
-
 <file path=customXml/itemProps1.xml><?xml version="1.0" encoding="utf-8"?>
-<ds:datastoreItem xmlns:ds="http://schemas.openxmlformats.org/officeDocument/2006/customXml" ds:itemID="{4B712E8C-4567-42DD-A849-ADB56BDEB999}">
+<ds:datastoreItem xmlns:ds="http://schemas.openxmlformats.org/officeDocument/2006/customXml" ds:itemID="{30154398-16CA-4A0E-98C6-099E0E94538D}">
   <ds:schemaRefs>
-    <ds:schemaRef ds:uri="http://schemas.microsoft.com/office/2006/metadata/contentType"/>
-    <ds:schemaRef ds:uri="http://schemas.microsoft.com/office/2006/metadata/properties/metaAttributes"/>
-    <ds:schemaRef ds:uri="http://www.w3.org/2001/XMLSchema"/>
-    <ds:schemaRef ds:uri="http://schemas.microsoft.com/office/2006/metadata/properties"/>
-    <ds:schemaRef ds:uri="http://schemas.openxmlformats.org/package/2006/metadata/core-properties"/>
-    <ds:schemaRef ds:uri="http://purl.org/dc/elements/1.1/"/>
-    <ds:schemaRef ds:uri="http://purl.org/dc/terms/"/>
-    <ds:schemaRef ds:uri="http://schemas.microsoft.com/internal/obd"/>
-    <ds:schemaRef ds:uri="http://schemas.microsoft.com/office/infopath/2007/PartnerControls"/>
+    <ds:schemaRef ds:uri="http://schemas.microsoft.com/sharepoint/v3/contenttype/forms"/>
   </ds:schemaRefs>
 </ds:datastoreItem>
 </file>
@@ -12229,9 +12221,17 @@
 </file>
 
 <file path=customXml/itemProps3.xml><?xml version="1.0" encoding="utf-8"?>
-<ds:datastoreItem xmlns:ds="http://schemas.openxmlformats.org/officeDocument/2006/customXml" ds:itemID="{30154398-16CA-4A0E-98C6-099E0E94538D}">
+<ds:datastoreItem xmlns:ds="http://schemas.openxmlformats.org/officeDocument/2006/customXml" ds:itemID="{4B712E8C-4567-42DD-A849-ADB56BDEB999}">
   <ds:schemaRefs>
-    <ds:schemaRef ds:uri="http://schemas.microsoft.com/sharepoint/v3/contenttype/forms"/>
+    <ds:schemaRef ds:uri="http://schemas.microsoft.com/office/2006/metadata/contentType"/>
+    <ds:schemaRef ds:uri="http://schemas.microsoft.com/office/2006/metadata/properties/metaAttributes"/>
+    <ds:schemaRef ds:uri="http://www.w3.org/2001/XMLSchema"/>
+    <ds:schemaRef ds:uri="http://schemas.microsoft.com/office/2006/metadata/properties"/>
+    <ds:schemaRef ds:uri="http://schemas.openxmlformats.org/package/2006/metadata/core-properties"/>
+    <ds:schemaRef ds:uri="http://purl.org/dc/elements/1.1/"/>
+    <ds:schemaRef ds:uri="http://purl.org/dc/terms/"/>
+    <ds:schemaRef ds:uri="http://schemas.microsoft.com/internal/obd"/>
+    <ds:schemaRef ds:uri="http://schemas.microsoft.com/office/infopath/2007/PartnerControls"/>
   </ds:schemaRefs>
 </ds:datastoreItem>
 </file>
</xml_diff>